<commit_message>
semana 4 dia 1
</commit_message>
<xml_diff>
--- a/0_Ramp_Up/documentos/Data Science - Ramp Up - Apoyo.pptx
+++ b/0_Ramp_Up/documentos/Data Science - Ramp Up - Apoyo.pptx
@@ -5,10 +5,10 @@
     <p:sldMasterId id="2147483660" r:id="rId1"/>
   </p:sldMasterIdLst>
   <p:notesMasterIdLst>
-    <p:notesMasterId r:id="rId9"/>
+    <p:notesMasterId r:id="rId10"/>
   </p:notesMasterIdLst>
   <p:handoutMasterIdLst>
-    <p:handoutMasterId r:id="rId10"/>
+    <p:handoutMasterId r:id="rId11"/>
   </p:handoutMasterIdLst>
   <p:sldIdLst>
     <p:sldId id="256" r:id="rId2"/>
@@ -18,6 +18,7 @@
     <p:sldId id="267" r:id="rId6"/>
     <p:sldId id="264" r:id="rId7"/>
     <p:sldId id="268" r:id="rId8"/>
+    <p:sldId id="269" r:id="rId9"/>
   </p:sldIdLst>
   <p:sldSz cx="12192000" cy="6858000"/>
   <p:notesSz cx="6858000" cy="9144000"/>
@@ -221,7 +222,7 @@
           <a:p>
             <a:fld id="{E2E1EB10-6A21-440E-BF2D-F14C49559F2A}" type="datetimeFigureOut">
               <a:rPr lang="es-ES" smtClean="0"/>
-              <a:t>02/07/2020</a:t>
+              <a:t>05/07/2020</a:t>
             </a:fld>
             <a:endParaRPr lang="es-ES"/>
           </a:p>
@@ -405,7 +406,7 @@
           <a:p>
             <a:fld id="{6030B40B-5C5C-408D-8E71-442557AE69BE}" type="datetimeFigureOut">
               <a:rPr lang="es-ES" smtClean="0"/>
-              <a:t>02/07/2020</a:t>
+              <a:t>05/07/2020</a:t>
             </a:fld>
             <a:endParaRPr lang="es-ES"/>
           </a:p>
@@ -807,7 +808,7 @@
           <a:p>
             <a:fld id="{5B772F0D-A02A-4702-8780-0B9BEC7A8699}" type="datetime1">
               <a:rPr lang="es-ES" smtClean="0"/>
-              <a:t>02/07/2020</a:t>
+              <a:t>05/07/2020</a:t>
             </a:fld>
             <a:endParaRPr lang="es-ES"/>
           </a:p>
@@ -980,7 +981,7 @@
           <a:p>
             <a:fld id="{B7089A12-8DCA-43F2-8141-5440FE76067E}" type="datetime1">
               <a:rPr lang="es-ES" smtClean="0"/>
-              <a:t>02/07/2020</a:t>
+              <a:t>05/07/2020</a:t>
             </a:fld>
             <a:endParaRPr lang="es-ES"/>
           </a:p>
@@ -1163,7 +1164,7 @@
           <a:p>
             <a:fld id="{1ECAA92C-77A8-40E9-B836-7A7337601971}" type="datetime1">
               <a:rPr lang="es-ES" smtClean="0"/>
-              <a:t>02/07/2020</a:t>
+              <a:t>05/07/2020</a:t>
             </a:fld>
             <a:endParaRPr lang="es-ES"/>
           </a:p>
@@ -1336,7 +1337,7 @@
           <a:p>
             <a:fld id="{76C3C7A2-BAD2-4CA0-B88A-B6452E90DFBC}" type="datetime1">
               <a:rPr lang="es-ES" smtClean="0"/>
-              <a:t>02/07/2020</a:t>
+              <a:t>05/07/2020</a:t>
             </a:fld>
             <a:endParaRPr lang="es-ES"/>
           </a:p>
@@ -1585,7 +1586,7 @@
           <a:p>
             <a:fld id="{ECA9CF60-F39A-43C0-966A-9235067209B8}" type="datetime1">
               <a:rPr lang="es-ES" smtClean="0"/>
-              <a:t>02/07/2020</a:t>
+              <a:t>05/07/2020</a:t>
             </a:fld>
             <a:endParaRPr lang="es-ES"/>
           </a:p>
@@ -1820,7 +1821,7 @@
           <a:p>
             <a:fld id="{4956C9BF-599C-46EE-897D-D3B566742584}" type="datetime1">
               <a:rPr lang="es-ES" smtClean="0"/>
-              <a:t>02/07/2020</a:t>
+              <a:t>05/07/2020</a:t>
             </a:fld>
             <a:endParaRPr lang="es-ES"/>
           </a:p>
@@ -2190,7 +2191,7 @@
           <a:p>
             <a:fld id="{95FE9576-1C9C-4DA4-A00A-9DD8D8245248}" type="datetime1">
               <a:rPr lang="es-ES" smtClean="0"/>
-              <a:t>02/07/2020</a:t>
+              <a:t>05/07/2020</a:t>
             </a:fld>
             <a:endParaRPr lang="es-ES"/>
           </a:p>
@@ -2311,7 +2312,7 @@
           <a:p>
             <a:fld id="{A25E806F-9BD2-4ABB-A643-CD5EC8F2EFC5}" type="datetime1">
               <a:rPr lang="es-ES" smtClean="0"/>
-              <a:t>02/07/2020</a:t>
+              <a:t>05/07/2020</a:t>
             </a:fld>
             <a:endParaRPr lang="es-ES"/>
           </a:p>
@@ -2409,7 +2410,7 @@
           <a:p>
             <a:fld id="{44D58291-17CD-4DFA-B627-8197516A579F}" type="datetime1">
               <a:rPr lang="es-ES" smtClean="0"/>
-              <a:t>02/07/2020</a:t>
+              <a:t>05/07/2020</a:t>
             </a:fld>
             <a:endParaRPr lang="es-ES"/>
           </a:p>
@@ -2689,7 +2690,7 @@
           <a:p>
             <a:fld id="{CE47F85A-B433-4D20-98A1-4063FF1FEBAE}" type="datetime1">
               <a:rPr lang="es-ES" smtClean="0"/>
-              <a:t>02/07/2020</a:t>
+              <a:t>05/07/2020</a:t>
             </a:fld>
             <a:endParaRPr lang="es-ES"/>
           </a:p>
@@ -2949,7 +2950,7 @@
           <a:p>
             <a:fld id="{88FF7EC7-7A16-44B9-9DAF-6069C283BDDE}" type="datetime1">
               <a:rPr lang="es-ES" smtClean="0"/>
-              <a:t>02/07/2020</a:t>
+              <a:t>05/07/2020</a:t>
             </a:fld>
             <a:endParaRPr lang="es-ES"/>
           </a:p>
@@ -3165,7 +3166,7 @@
           <a:p>
             <a:fld id="{1FF7DE26-E335-45E6-BFEF-90CB33A4197F}" type="datetime1">
               <a:rPr lang="es-ES" smtClean="0"/>
-              <a:t>02/07/2020</a:t>
+              <a:t>05/07/2020</a:t>
             </a:fld>
             <a:endParaRPr lang="es-ES"/>
           </a:p>
@@ -6779,6 +6780,83 @@
     <p:extLst>
       <p:ext uri="{BB962C8B-B14F-4D97-AF65-F5344CB8AC3E}">
         <p14:creationId xmlns:p14="http://schemas.microsoft.com/office/powerpoint/2010/main" val="3401517820"/>
+      </p:ext>
+    </p:extLst>
+  </p:cSld>
+  <p:clrMapOvr>
+    <a:masterClrMapping/>
+  </p:clrMapOvr>
+</p:sld>
+</file>
+
+<file path=ppt/slides/slide8.xml><?xml version="1.0" encoding="utf-8"?>
+<p:sld xmlns:a="http://schemas.openxmlformats.org/drawingml/2006/main" xmlns:r="http://schemas.openxmlformats.org/officeDocument/2006/relationships" xmlns:p="http://schemas.openxmlformats.org/presentationml/2006/main">
+  <p:cSld>
+    <p:spTree>
+      <p:nvGrpSpPr>
+        <p:cNvPr id="1" name=""/>
+        <p:cNvGrpSpPr/>
+        <p:nvPr/>
+      </p:nvGrpSpPr>
+      <p:grpSpPr>
+        <a:xfrm>
+          <a:off x="0" y="0"/>
+          <a:ext cx="0" cy="0"/>
+          <a:chOff x="0" y="0"/>
+          <a:chExt cx="0" cy="0"/>
+        </a:xfrm>
+      </p:grpSpPr>
+      <p:pic>
+        <p:nvPicPr>
+          <p:cNvPr id="1026" name="Picture 2" descr="Top 21 Python Libraries a Data Scientist must know - TechVidvan">
+            <a:extLst>
+              <a:ext uri="{FF2B5EF4-FFF2-40B4-BE49-F238E27FC236}">
+                <a16:creationId xmlns:a16="http://schemas.microsoft.com/office/drawing/2014/main" id="{A854CDDF-A198-492F-A4DC-54FB542A81FB}"/>
+              </a:ext>
+            </a:extLst>
+          </p:cNvPr>
+          <p:cNvPicPr>
+            <a:picLocks noChangeAspect="1" noChangeArrowheads="1"/>
+          </p:cNvPicPr>
+          <p:nvPr/>
+        </p:nvPicPr>
+        <p:blipFill>
+          <a:blip r:embed="rId2">
+            <a:extLst>
+              <a:ext uri="{28A0092B-C50C-407E-A947-70E740481C1C}">
+                <a14:useLocalDpi xmlns:a14="http://schemas.microsoft.com/office/drawing/2010/main" val="0"/>
+              </a:ext>
+            </a:extLst>
+          </a:blip>
+          <a:srcRect/>
+          <a:stretch>
+            <a:fillRect/>
+          </a:stretch>
+        </p:blipFill>
+        <p:spPr bwMode="auto">
+          <a:xfrm>
+            <a:off x="1551730" y="883577"/>
+            <a:ext cx="9279667" cy="4859676"/>
+          </a:xfrm>
+          <a:prstGeom prst="rect">
+            <a:avLst/>
+          </a:prstGeom>
+          <a:noFill/>
+          <a:extLst>
+            <a:ext uri="{909E8E84-426E-40DD-AFC4-6F175D3DCCD1}">
+              <a14:hiddenFill xmlns:a14="http://schemas.microsoft.com/office/drawing/2010/main">
+                <a:solidFill>
+                  <a:srgbClr val="FFFFFF"/>
+                </a:solidFill>
+              </a14:hiddenFill>
+            </a:ext>
+          </a:extLst>
+        </p:spPr>
+      </p:pic>
+    </p:spTree>
+    <p:extLst>
+      <p:ext uri="{BB962C8B-B14F-4D97-AF65-F5344CB8AC3E}">
+        <p14:creationId xmlns:p14="http://schemas.microsoft.com/office/powerpoint/2010/main" val="3686797418"/>
       </p:ext>
     </p:extLst>
   </p:cSld>

</xml_diff>